<commit_message>
Upgrade shapes lab test
</commit_message>
<xml_diff>
--- a/doc/test/ExpShapeGalleryAftImport.pptx
+++ b/doc/test/ExpShapeGalleryAftImport.pptx
@@ -7,6 +7,7 @@
   <p:sldIdLst>
     <p:sldId id="256" r:id="rId2"/>
     <p:sldId id="257" r:id="rId3"/>
+    <p:sldId id="258" r:id="rId4"/>
   </p:sldIdLst>
   <p:sldSz cx="12192000" cy="6858000"/>
   <p:notesSz cx="6858000" cy="9144000"/>
@@ -239,7 +240,7 @@
           <a:p>
             <a:fld id="{52139ADB-AB0F-4ADF-96D3-5BF7DC35A489}" type="datetimeFigureOut">
               <a:rPr lang="zh-CN" altLang="en-US" smtClean="0"/>
-              <a:t>2015/6/21</a:t>
+              <a:t>2015/7/14</a:t>
             </a:fld>
             <a:endParaRPr lang="zh-CN" altLang="en-US"/>
           </a:p>
@@ -409,7 +410,7 @@
           <a:p>
             <a:fld id="{52139ADB-AB0F-4ADF-96D3-5BF7DC35A489}" type="datetimeFigureOut">
               <a:rPr lang="zh-CN" altLang="en-US" smtClean="0"/>
-              <a:t>2015/6/21</a:t>
+              <a:t>2015/7/14</a:t>
             </a:fld>
             <a:endParaRPr lang="zh-CN" altLang="en-US"/>
           </a:p>
@@ -589,7 +590,7 @@
           <a:p>
             <a:fld id="{52139ADB-AB0F-4ADF-96D3-5BF7DC35A489}" type="datetimeFigureOut">
               <a:rPr lang="zh-CN" altLang="en-US" smtClean="0"/>
-              <a:t>2015/6/21</a:t>
+              <a:t>2015/7/14</a:t>
             </a:fld>
             <a:endParaRPr lang="zh-CN" altLang="en-US"/>
           </a:p>
@@ -759,7 +760,7 @@
           <a:p>
             <a:fld id="{52139ADB-AB0F-4ADF-96D3-5BF7DC35A489}" type="datetimeFigureOut">
               <a:rPr lang="zh-CN" altLang="en-US" smtClean="0"/>
-              <a:t>2015/6/21</a:t>
+              <a:t>2015/7/14</a:t>
             </a:fld>
             <a:endParaRPr lang="zh-CN" altLang="en-US"/>
           </a:p>
@@ -1005,7 +1006,7 @@
           <a:p>
             <a:fld id="{52139ADB-AB0F-4ADF-96D3-5BF7DC35A489}" type="datetimeFigureOut">
               <a:rPr lang="zh-CN" altLang="en-US" smtClean="0"/>
-              <a:t>2015/6/21</a:t>
+              <a:t>2015/7/14</a:t>
             </a:fld>
             <a:endParaRPr lang="zh-CN" altLang="en-US"/>
           </a:p>
@@ -1237,7 +1238,7 @@
           <a:p>
             <a:fld id="{52139ADB-AB0F-4ADF-96D3-5BF7DC35A489}" type="datetimeFigureOut">
               <a:rPr lang="zh-CN" altLang="en-US" smtClean="0"/>
-              <a:t>2015/6/21</a:t>
+              <a:t>2015/7/14</a:t>
             </a:fld>
             <a:endParaRPr lang="zh-CN" altLang="en-US"/>
           </a:p>
@@ -1604,7 +1605,7 @@
           <a:p>
             <a:fld id="{52139ADB-AB0F-4ADF-96D3-5BF7DC35A489}" type="datetimeFigureOut">
               <a:rPr lang="zh-CN" altLang="en-US" smtClean="0"/>
-              <a:t>2015/6/21</a:t>
+              <a:t>2015/7/14</a:t>
             </a:fld>
             <a:endParaRPr lang="zh-CN" altLang="en-US"/>
           </a:p>
@@ -1722,7 +1723,7 @@
           <a:p>
             <a:fld id="{52139ADB-AB0F-4ADF-96D3-5BF7DC35A489}" type="datetimeFigureOut">
               <a:rPr lang="zh-CN" altLang="en-US" smtClean="0"/>
-              <a:t>2015/6/21</a:t>
+              <a:t>2015/7/14</a:t>
             </a:fld>
             <a:endParaRPr lang="zh-CN" altLang="en-US"/>
           </a:p>
@@ -1817,7 +1818,7 @@
           <a:p>
             <a:fld id="{52139ADB-AB0F-4ADF-96D3-5BF7DC35A489}" type="datetimeFigureOut">
               <a:rPr lang="zh-CN" altLang="en-US" smtClean="0"/>
-              <a:t>2015/6/21</a:t>
+              <a:t>2015/7/14</a:t>
             </a:fld>
             <a:endParaRPr lang="zh-CN" altLang="en-US"/>
           </a:p>
@@ -2094,7 +2095,7 @@
           <a:p>
             <a:fld id="{52139ADB-AB0F-4ADF-96D3-5BF7DC35A489}" type="datetimeFigureOut">
               <a:rPr lang="zh-CN" altLang="en-US" smtClean="0"/>
-              <a:t>2015/6/21</a:t>
+              <a:t>2015/7/14</a:t>
             </a:fld>
             <a:endParaRPr lang="zh-CN" altLang="en-US"/>
           </a:p>
@@ -2347,7 +2348,7 @@
           <a:p>
             <a:fld id="{52139ADB-AB0F-4ADF-96D3-5BF7DC35A489}" type="datetimeFigureOut">
               <a:rPr lang="zh-CN" altLang="en-US" smtClean="0"/>
-              <a:t>2015/6/21</a:t>
+              <a:t>2015/7/14</a:t>
             </a:fld>
             <a:endParaRPr lang="zh-CN" altLang="en-US"/>
           </a:p>
@@ -2560,7 +2561,7 @@
           <a:p>
             <a:fld id="{52139ADB-AB0F-4ADF-96D3-5BF7DC35A489}" type="datetimeFigureOut">
               <a:rPr lang="zh-CN" altLang="en-US" smtClean="0"/>
-              <a:t>2015/6/21</a:t>
+              <a:t>2015/7/14</a:t>
             </a:fld>
             <a:endParaRPr lang="zh-CN" altLang="en-US"/>
           </a:p>
@@ -2988,10 +2989,10 @@
           <a:lstStyle/>
           <a:p>
             <a:r>
-              <a:rPr lang="en-US" altLang="zh-CN" smtClean="0"/>
+              <a:rPr lang="en-US" altLang="zh-CN" dirty="0" smtClean="0"/>
               <a:t>Category: My Shapes331267876</a:t>
             </a:r>
-            <a:endParaRPr lang="zh-CN" altLang="en-US"/>
+            <a:endParaRPr lang="zh-CN" altLang="en-US" dirty="0"/>
           </a:p>
         </p:txBody>
       </p:sp>
@@ -6024,6 +6025,96 @@
 </p:sld>
 </file>
 
+<file path=ppt/slides/slide3.xml><?xml version="1.0" encoding="utf-8"?>
+<p:sld xmlns:a="http://schemas.openxmlformats.org/drawingml/2006/main" xmlns:r="http://schemas.openxmlformats.org/officeDocument/2006/relationships" xmlns:p="http://schemas.openxmlformats.org/presentationml/2006/main">
+  <p:cSld>
+    <p:spTree>
+      <p:nvGrpSpPr>
+        <p:cNvPr id="1" name=""/>
+        <p:cNvGrpSpPr/>
+        <p:nvPr/>
+      </p:nvGrpSpPr>
+      <p:grpSpPr>
+        <a:xfrm>
+          <a:off x="0" y="0"/>
+          <a:ext cx="0" cy="0"/>
+          <a:chOff x="0" y="0"/>
+          <a:chExt cx="0" cy="0"/>
+        </a:xfrm>
+      </p:grpSpPr>
+      <p:sp>
+        <p:nvSpPr>
+          <p:cNvPr id="4" name="TextBox 3"/>
+          <p:cNvSpPr txBox="1"/>
+          <p:nvPr/>
+        </p:nvSpPr>
+        <p:spPr>
+          <a:xfrm>
+            <a:off x="0" y="0"/>
+            <a:ext cx="12192000" cy="369332"/>
+          </a:xfrm>
+          <a:prstGeom prst="rect">
+            <a:avLst/>
+          </a:prstGeom>
+          <a:noFill/>
+        </p:spPr>
+        <p:txBody>
+          <a:bodyPr vert="horz" rtlCol="0">
+            <a:spAutoFit/>
+          </a:bodyPr>
+          <a:lstStyle/>
+          <a:p>
+            <a:r>
+              <a:rPr lang="en-US" altLang="zh-CN" dirty="0" smtClean="0"/>
+              <a:t>Category: Untitled Category 1</a:t>
+            </a:r>
+            <a:endParaRPr lang="zh-CN" altLang="en-US" dirty="0"/>
+          </a:p>
+        </p:txBody>
+      </p:sp>
+      <p:pic>
+        <p:nvPicPr>
+          <p:cNvPr id="5" name="Picture 3"/>
+          <p:cNvPicPr>
+            <a:picLocks noChangeAspect="1"/>
+          </p:cNvPicPr>
+          <p:nvPr/>
+        </p:nvPicPr>
+        <p:blipFill>
+          <a:blip r:embed="rId2" cstate="print">
+            <a:extLst>
+              <a:ext uri="{28A0092B-C50C-407E-A947-70E740481C1C}">
+                <a14:useLocalDpi xmlns:a14="http://schemas.microsoft.com/office/drawing/2010/main" val="0"/>
+              </a:ext>
+            </a:extLst>
+          </a:blip>
+          <a:stretch>
+            <a:fillRect/>
+          </a:stretch>
+        </p:blipFill>
+        <p:spPr>
+          <a:xfrm>
+            <a:off x="5825878" y="3158869"/>
+            <a:ext cx="540243" cy="540262"/>
+          </a:xfrm>
+          <a:prstGeom prst="rect">
+            <a:avLst/>
+          </a:prstGeom>
+        </p:spPr>
+      </p:pic>
+    </p:spTree>
+    <p:extLst>
+      <p:ext uri="{BB962C8B-B14F-4D97-AF65-F5344CB8AC3E}">
+        <p14:creationId xmlns:p14="http://schemas.microsoft.com/office/powerpoint/2010/main" val="3557646205"/>
+      </p:ext>
+    </p:extLst>
+  </p:cSld>
+  <p:clrMapOvr>
+    <a:masterClrMapping/>
+  </p:clrMapOvr>
+</p:sld>
+</file>
+
 <file path=ppt/theme/theme1.xml><?xml version="1.0" encoding="utf-8"?>
 <a:theme xmlns:a="http://schemas.openxmlformats.org/drawingml/2006/main" name="Office Theme">
   <a:themeElements>
@@ -6067,7 +6158,7 @@
     </a:clrScheme>
     <a:fontScheme name="Office">
       <a:majorFont>
-        <a:latin typeface="Calibri Light" panose="020F0302020204030204"/>
+        <a:latin typeface="Calibri Light"/>
         <a:ea typeface=""/>
         <a:cs typeface=""/>
         <a:font script="Jpan" typeface="ＭＳ Ｐゴシック"/>
@@ -6102,7 +6193,7 @@
         <a:font script="Geor" typeface="Sylfaen"/>
       </a:majorFont>
       <a:minorFont>
-        <a:latin typeface="Calibri" panose="020F0502020204030204"/>
+        <a:latin typeface="Calibri"/>
         <a:ea typeface=""/>
         <a:cs typeface=""/>
         <a:font script="Jpan" typeface="ＭＳ Ｐゴシック"/>
@@ -6279,7 +6370,7 @@
   <a:extraClrSchemeLst/>
   <a:extLst>
     <a:ext uri="{05A4C25C-085E-4340-85A3-A5531E510DB2}">
-      <thm15:themeFamily xmlns:thm15="http://schemas.microsoft.com/office/thememl/2012/main" name="Office Theme" id="{62F939B6-93AF-4DB8-9C6B-D6C7DFDC589F}" vid="{4A3C46E8-61CC-4603-A589-7422A47A8E4A}"/>
+      <thm15:themeFamily xmlns:thm15="http://schemas.microsoft.com/office/thememl/2012/main" xmlns="" name="Office Theme" id="{62F939B6-93AF-4DB8-9C6B-D6C7DFDC589F}" vid="{4A3C46E8-61CC-4603-A589-7422A47A8E4A}"/>
     </a:ext>
   </a:extLst>
 </a:theme>

</xml_diff>